<commit_message>
adding product compass image
</commit_message>
<xml_diff>
--- a/api-days-paris-dec-2018/img/compass-examples.pptx
+++ b/api-days-paris-dec-2018/img/compass-examples.pptx
@@ -1659,19 +1659,34 @@
                 <c:formatCode>General</c:formatCode>
                 <c:ptCount val="10"/>
                 <c:pt idx="0">
-                  <c:v>32</c:v>
+                  <c:v>3</c:v>
                 </c:pt>
                 <c:pt idx="1">
-                  <c:v>32</c:v>
+                  <c:v>4</c:v>
                 </c:pt>
                 <c:pt idx="2">
-                  <c:v>28</c:v>
+                  <c:v>5</c:v>
                 </c:pt>
                 <c:pt idx="3">
-                  <c:v>12</c:v>
+                  <c:v>7</c:v>
                 </c:pt>
                 <c:pt idx="4">
-                  <c:v>15</c:v>
+                  <c:v>1</c:v>
+                </c:pt>
+                <c:pt idx="5">
+                  <c:v>1</c:v>
+                </c:pt>
+                <c:pt idx="6">
+                  <c:v>4</c:v>
+                </c:pt>
+                <c:pt idx="7">
+                  <c:v>1</c:v>
+                </c:pt>
+                <c:pt idx="8">
+                  <c:v>1</c:v>
+                </c:pt>
+                <c:pt idx="9">
+                  <c:v>1</c:v>
                 </c:pt>
               </c:numCache>
             </c:numRef>
@@ -1753,19 +1768,34 @@
                 <c:formatCode>General</c:formatCode>
                 <c:ptCount val="10"/>
                 <c:pt idx="0">
-                  <c:v>12</c:v>
+                  <c:v>5</c:v>
                 </c:pt>
                 <c:pt idx="1">
-                  <c:v>12</c:v>
+                  <c:v>6</c:v>
                 </c:pt>
                 <c:pt idx="2">
-                  <c:v>12</c:v>
+                  <c:v>6</c:v>
                 </c:pt>
                 <c:pt idx="3">
-                  <c:v>21</c:v>
+                  <c:v>4</c:v>
                 </c:pt>
                 <c:pt idx="4">
-                  <c:v>28</c:v>
+                  <c:v>4</c:v>
+                </c:pt>
+                <c:pt idx="5">
+                  <c:v>4</c:v>
+                </c:pt>
+                <c:pt idx="6">
+                  <c:v>6</c:v>
+                </c:pt>
+                <c:pt idx="7">
+                  <c:v>2</c:v>
+                </c:pt>
+                <c:pt idx="8">
+                  <c:v>1</c:v>
+                </c:pt>
+                <c:pt idx="9">
+                  <c:v>3</c:v>
                 </c:pt>
               </c:numCache>
             </c:numRef>
@@ -1847,19 +1877,34 @@
                 <c:formatCode>General</c:formatCode>
                 <c:ptCount val="10"/>
                 <c:pt idx="0">
-                  <c:v>12</c:v>
+                  <c:v>1</c:v>
                 </c:pt>
                 <c:pt idx="1">
-                  <c:v>12</c:v>
+                  <c:v>2</c:v>
                 </c:pt>
                 <c:pt idx="2">
-                  <c:v>12</c:v>
+                  <c:v>2</c:v>
                 </c:pt>
                 <c:pt idx="3">
-                  <c:v>21</c:v>
+                  <c:v>5</c:v>
                 </c:pt>
                 <c:pt idx="4">
-                  <c:v>28</c:v>
+                  <c:v>3</c:v>
+                </c:pt>
+                <c:pt idx="5">
+                  <c:v>2</c:v>
+                </c:pt>
+                <c:pt idx="6">
+                  <c:v>5</c:v>
+                </c:pt>
+                <c:pt idx="7">
+                  <c:v>3</c:v>
+                </c:pt>
+                <c:pt idx="8">
+                  <c:v>2</c:v>
+                </c:pt>
+                <c:pt idx="9">
+                  <c:v>2</c:v>
                 </c:pt>
               </c:numCache>
             </c:numRef>
@@ -7070,7 +7115,7 @@
           <p:nvPr>
             <p:extLst>
               <p:ext uri="{D42A27DB-BD31-4B8C-83A1-F6EECF244321}">
-                <p14:modId xmlns:p14="http://schemas.microsoft.com/office/powerpoint/2010/main" val="1176140080"/>
+                <p14:modId xmlns:p14="http://schemas.microsoft.com/office/powerpoint/2010/main" val="1023446657"/>
               </p:ext>
             </p:extLst>
           </p:nvPr>

</xml_diff>